<commit_message>
More fixes to report
</commit_message>
<xml_diff>
--- a/Report/presentazione.pptx
+++ b/Report/presentazione.pptx
@@ -18,7 +18,6 @@
     <p:sldId id="265" r:id="rId13"/>
     <p:sldId id="266" r:id="rId14"/>
     <p:sldId id="267" r:id="rId15"/>
-    <p:sldId id="268" r:id="rId16"/>
   </p:sldIdLst>
   <p:sldSz cx="12192000" cy="6858000"/>
   <p:notesSz cx="7772400" cy="10058400"/>
@@ -2777,7 +2776,7 @@
         <p:spPr>
           <a:xfrm>
             <a:off x="0" y="0"/>
-            <a:ext cx="12187800" cy="6855120"/>
+            <a:ext cx="12187440" cy="6854760"/>
           </a:xfrm>
           <a:prstGeom prst="rect">
             <a:avLst/>
@@ -2800,7 +2799,7 @@
         <p:spPr>
           <a:xfrm>
             <a:off x="609480" y="273600"/>
-            <a:ext cx="10972080" cy="1144440"/>
+            <a:ext cx="10972440" cy="1144800"/>
           </a:xfrm>
           <a:prstGeom prst="rect">
             <a:avLst/>
@@ -2813,12 +2812,12 @@
           <a:p>
             <a:pPr algn="ctr"/>
             <a:r>
-              <a:rPr b="0" lang="it-IT" sz="1800" spc="-1" strike="noStrike">
+              <a:rPr b="0" lang="it-IT" sz="4400" spc="-1" strike="noStrike">
                 <a:latin typeface="Arial"/>
               </a:rPr>
               <a:t>Fai clic per modificare il formato del testo del titolo</a:t>
             </a:r>
-            <a:endParaRPr b="0" lang="it-IT" sz="1800" spc="-1" strike="noStrike">
+            <a:endParaRPr b="0" lang="it-IT" sz="4400" spc="-1" strike="noStrike">
               <a:latin typeface="Arial"/>
             </a:endParaRPr>
           </a:p>
@@ -2837,7 +2836,7 @@
         <p:spPr>
           <a:xfrm>
             <a:off x="609480" y="1604520"/>
-            <a:ext cx="10972080" cy="3976920"/>
+            <a:ext cx="10972440" cy="3977280"/>
           </a:xfrm>
           <a:prstGeom prst="rect">
             <a:avLst/>
@@ -2848,7 +2847,7 @@
             <a:normAutofit/>
           </a:bodyPr>
           <a:p>
-            <a:pPr marL="432000" indent="-324000" algn="ctr">
+            <a:pPr marL="432000" indent="-324000">
               <a:spcBef>
                 <a:spcPts val="1417"/>
               </a:spcBef>
@@ -2860,17 +2859,17 @@
               <a:buChar char=""/>
             </a:pPr>
             <a:r>
-              <a:rPr b="0" lang="it-IT" sz="1800" spc="-1" strike="noStrike">
+              <a:rPr b="0" lang="it-IT" sz="3200" spc="-1" strike="noStrike">
                 <a:latin typeface="Arial"/>
               </a:rPr>
               <a:t>Fai clic per modificare il formato del testo della struttura</a:t>
             </a:r>
-            <a:endParaRPr b="0" lang="it-IT" sz="1800" spc="-1" strike="noStrike">
-              <a:latin typeface="Arial"/>
-            </a:endParaRPr>
-          </a:p>
-          <a:p>
-            <a:pPr lvl="1" marL="864000" indent="-324000" algn="ctr">
+            <a:endParaRPr b="0" lang="it-IT" sz="3200" spc="-1" strike="noStrike">
+              <a:latin typeface="Arial"/>
+            </a:endParaRPr>
+          </a:p>
+          <a:p>
+            <a:pPr lvl="1" marL="864000" indent="-324000">
               <a:spcBef>
                 <a:spcPts val="1134"/>
               </a:spcBef>
@@ -2882,17 +2881,17 @@
               <a:buChar char=""/>
             </a:pPr>
             <a:r>
-              <a:rPr b="0" lang="it-IT" sz="1800" spc="-1" strike="noStrike">
+              <a:rPr b="0" lang="it-IT" sz="2800" spc="-1" strike="noStrike">
                 <a:latin typeface="Arial"/>
               </a:rPr>
               <a:t>Secondo livello struttura</a:t>
             </a:r>
-            <a:endParaRPr b="0" lang="it-IT" sz="1800" spc="-1" strike="noStrike">
-              <a:latin typeface="Arial"/>
-            </a:endParaRPr>
-          </a:p>
-          <a:p>
-            <a:pPr lvl="2" marL="1296000" indent="-288000" algn="ctr">
+            <a:endParaRPr b="0" lang="it-IT" sz="2800" spc="-1" strike="noStrike">
+              <a:latin typeface="Arial"/>
+            </a:endParaRPr>
+          </a:p>
+          <a:p>
+            <a:pPr lvl="2" marL="1296000" indent="-288000">
               <a:spcBef>
                 <a:spcPts val="850"/>
               </a:spcBef>
@@ -2904,17 +2903,17 @@
               <a:buChar char=""/>
             </a:pPr>
             <a:r>
-              <a:rPr b="0" lang="it-IT" sz="1800" spc="-1" strike="noStrike">
+              <a:rPr b="0" lang="it-IT" sz="2400" spc="-1" strike="noStrike">
                 <a:latin typeface="Arial"/>
               </a:rPr>
               <a:t>Terzo livello struttura</a:t>
             </a:r>
-            <a:endParaRPr b="0" lang="it-IT" sz="1800" spc="-1" strike="noStrike">
-              <a:latin typeface="Arial"/>
-            </a:endParaRPr>
-          </a:p>
-          <a:p>
-            <a:pPr lvl="3" marL="1728000" indent="-216000" algn="ctr">
+            <a:endParaRPr b="0" lang="it-IT" sz="2400" spc="-1" strike="noStrike">
+              <a:latin typeface="Arial"/>
+            </a:endParaRPr>
+          </a:p>
+          <a:p>
+            <a:pPr lvl="3" marL="1728000" indent="-216000">
               <a:spcBef>
                 <a:spcPts val="567"/>
               </a:spcBef>
@@ -2926,17 +2925,17 @@
               <a:buChar char=""/>
             </a:pPr>
             <a:r>
-              <a:rPr b="0" lang="it-IT" sz="1800" spc="-1" strike="noStrike">
+              <a:rPr b="0" lang="it-IT" sz="2000" spc="-1" strike="noStrike">
                 <a:latin typeface="Arial"/>
               </a:rPr>
               <a:t>Quarto livello struttura</a:t>
             </a:r>
-            <a:endParaRPr b="0" lang="it-IT" sz="1800" spc="-1" strike="noStrike">
-              <a:latin typeface="Arial"/>
-            </a:endParaRPr>
-          </a:p>
-          <a:p>
-            <a:pPr lvl="4" marL="2160000" indent="-216000" algn="ctr">
+            <a:endParaRPr b="0" lang="it-IT" sz="2000" spc="-1" strike="noStrike">
+              <a:latin typeface="Arial"/>
+            </a:endParaRPr>
+          </a:p>
+          <a:p>
+            <a:pPr lvl="4" marL="2160000" indent="-216000">
               <a:spcBef>
                 <a:spcPts val="283"/>
               </a:spcBef>
@@ -2948,17 +2947,17 @@
               <a:buChar char=""/>
             </a:pPr>
             <a:r>
-              <a:rPr b="0" lang="it-IT" sz="1800" spc="-1" strike="noStrike">
+              <a:rPr b="0" lang="it-IT" sz="2000" spc="-1" strike="noStrike">
                 <a:latin typeface="Arial"/>
               </a:rPr>
               <a:t>Quinto livello struttura</a:t>
             </a:r>
-            <a:endParaRPr b="0" lang="it-IT" sz="1800" spc="-1" strike="noStrike">
-              <a:latin typeface="Arial"/>
-            </a:endParaRPr>
-          </a:p>
-          <a:p>
-            <a:pPr lvl="5" marL="2592000" indent="-216000" algn="ctr">
+            <a:endParaRPr b="0" lang="it-IT" sz="2000" spc="-1" strike="noStrike">
+              <a:latin typeface="Arial"/>
+            </a:endParaRPr>
+          </a:p>
+          <a:p>
+            <a:pPr lvl="5" marL="2592000" indent="-216000">
               <a:spcBef>
                 <a:spcPts val="283"/>
               </a:spcBef>
@@ -2970,17 +2969,17 @@
               <a:buChar char=""/>
             </a:pPr>
             <a:r>
-              <a:rPr b="0" lang="it-IT" sz="1800" spc="-1" strike="noStrike">
+              <a:rPr b="0" lang="it-IT" sz="2000" spc="-1" strike="noStrike">
                 <a:latin typeface="Arial"/>
               </a:rPr>
               <a:t>Sesto livello struttura</a:t>
             </a:r>
-            <a:endParaRPr b="0" lang="it-IT" sz="1800" spc="-1" strike="noStrike">
-              <a:latin typeface="Arial"/>
-            </a:endParaRPr>
-          </a:p>
-          <a:p>
-            <a:pPr lvl="6" marL="3024000" indent="-216000" algn="ctr">
+            <a:endParaRPr b="0" lang="it-IT" sz="2000" spc="-1" strike="noStrike">
+              <a:latin typeface="Arial"/>
+            </a:endParaRPr>
+          </a:p>
+          <a:p>
+            <a:pPr lvl="6" marL="3024000" indent="-216000">
               <a:spcBef>
                 <a:spcPts val="283"/>
               </a:spcBef>
@@ -2992,12 +2991,12 @@
               <a:buChar char=""/>
             </a:pPr>
             <a:r>
-              <a:rPr b="0" lang="it-IT" sz="1800" spc="-1" strike="noStrike">
+              <a:rPr b="0" lang="it-IT" sz="2000" spc="-1" strike="noStrike">
                 <a:latin typeface="Arial"/>
               </a:rPr>
               <a:t>Settimo livello struttura</a:t>
             </a:r>
-            <a:endParaRPr b="0" lang="it-IT" sz="1800" spc="-1" strike="noStrike">
+            <a:endParaRPr b="0" lang="it-IT" sz="2000" spc="-1" strike="noStrike">
               <a:latin typeface="Arial"/>
             </a:endParaRPr>
           </a:p>
@@ -3063,7 +3062,7 @@
         <p:spPr>
           <a:xfrm>
             <a:off x="0" y="0"/>
-            <a:ext cx="12187800" cy="6855120"/>
+            <a:ext cx="12187440" cy="6854760"/>
           </a:xfrm>
           <a:prstGeom prst="rect">
             <a:avLst/>
@@ -3335,7 +3334,7 @@
         <p:spPr>
           <a:xfrm>
             <a:off x="3962520" y="1964160"/>
-            <a:ext cx="7196760" cy="2420280"/>
+            <a:ext cx="7196400" cy="2419920"/>
           </a:xfrm>
           <a:prstGeom prst="rect">
             <a:avLst/>
@@ -3391,7 +3390,7 @@
                 <a:latin typeface="Calibri Light"/>
                 <a:ea typeface="DejaVu Sans"/>
               </a:rPr>
-              <a:t>full domain k- anonymity</a:t>
+              <a:t>full domain k-anonymity</a:t>
             </a:r>
             <a:endParaRPr b="0" lang="it-IT" sz="4800" spc="-1" strike="noStrike">
               <a:latin typeface="Arial"/>
@@ -3408,7 +3407,7 @@
         <p:spPr>
           <a:xfrm>
             <a:off x="3962520" y="4385880"/>
-            <a:ext cx="7196760" cy="1404360"/>
+            <a:ext cx="7196400" cy="1404000"/>
           </a:xfrm>
           <a:prstGeom prst="rect">
             <a:avLst/>
@@ -3542,7 +3541,7 @@
         <p:spPr>
           <a:xfrm>
             <a:off x="914400" y="177120"/>
-            <a:ext cx="10403280" cy="6517800"/>
+            <a:ext cx="10402920" cy="6517440"/>
           </a:xfrm>
           <a:prstGeom prst="rect">
             <a:avLst/>
@@ -3594,7 +3593,7 @@
         <p:spPr>
           <a:xfrm>
             <a:off x="685800" y="0"/>
-            <a:ext cx="10130400" cy="1316160"/>
+            <a:ext cx="10130040" cy="1315800"/>
           </a:xfrm>
           <a:prstGeom prst="rect">
             <a:avLst/>
@@ -3649,7 +3648,7 @@
         <p:spPr>
           <a:xfrm>
             <a:off x="685800" y="1829520"/>
-            <a:ext cx="10666800" cy="3695760"/>
+            <a:ext cx="10666440" cy="3695400"/>
           </a:xfrm>
           <a:prstGeom prst="rect">
             <a:avLst/>
@@ -3672,7 +3671,7 @@
         <p:spPr>
           <a:xfrm>
             <a:off x="685800" y="1829520"/>
-            <a:ext cx="4928040" cy="3695760"/>
+            <a:ext cx="4927680" cy="3695400"/>
           </a:xfrm>
           <a:prstGeom prst="rect">
             <a:avLst/>
@@ -3721,7 +3720,7 @@
         <p:spPr>
           <a:xfrm>
             <a:off x="685800" y="0"/>
-            <a:ext cx="10130400" cy="1316160"/>
+            <a:ext cx="10130040" cy="1315800"/>
           </a:xfrm>
           <a:prstGeom prst="rect">
             <a:avLst/>
@@ -3776,7 +3775,7 @@
         <p:spPr>
           <a:xfrm>
             <a:off x="685800" y="1829520"/>
-            <a:ext cx="10666800" cy="3695760"/>
+            <a:ext cx="10666440" cy="3695400"/>
           </a:xfrm>
           <a:prstGeom prst="rect">
             <a:avLst/>
@@ -3799,60 +3798,7 @@
         <p:spPr>
           <a:xfrm>
             <a:off x="5751360" y="1833120"/>
-            <a:ext cx="4923360" cy="3692160"/>
-          </a:xfrm>
-          <a:prstGeom prst="rect">
-            <a:avLst/>
-          </a:prstGeom>
-          <a:ln>
-            <a:noFill/>
-          </a:ln>
-        </p:spPr>
-      </p:pic>
-    </p:spTree>
-  </p:cSld>
-  <mc:AlternateContent>
-    <mc:Choice Requires="p14">
-      <p:transition spd="slow" p14:dur="2000"/>
-    </mc:Choice>
-    <mc:Fallback>
-      <p:transition spd="slow"/>
-    </mc:Fallback>
-  </mc:AlternateContent>
-</p:sld>
-</file>
-
-<file path=ppt/slides/slide13.xml><?xml version="1.0" encoding="utf-8"?>
-<p:sld xmlns:a="http://schemas.openxmlformats.org/drawingml/2006/main" xmlns:p="http://schemas.openxmlformats.org/presentationml/2006/main" xmlns:r="http://schemas.openxmlformats.org/officeDocument/2006/relationships" xmlns:p14="http://schemas.microsoft.com/office/powerpoint/2010/main" xmlns:p15="http://schemas.microsoft.com/office/powerpoint/2012/main" xmlns:mc="http://schemas.openxmlformats.org/markup-compatibility/2006">
-  <p:cSld>
-    <p:spTree>
-      <p:nvGrpSpPr>
-        <p:cNvPr id="1" name=""/>
-        <p:cNvGrpSpPr/>
-        <p:nvPr/>
-      </p:nvGrpSpPr>
-      <p:grpSpPr>
-        <a:xfrm>
-          <a:off x="0" y="0"/>
-          <a:ext cx="0" cy="0"/>
-          <a:chOff x="0" y="0"/>
-          <a:chExt cx="0" cy="0"/>
-        </a:xfrm>
-      </p:grpSpPr>
-      <p:pic>
-        <p:nvPicPr>
-          <p:cNvPr id="102" name="Immagine 3" descr=""/>
-          <p:cNvPicPr/>
-          <p:nvPr/>
-        </p:nvPicPr>
-        <p:blipFill>
-          <a:blip r:embed="rId1"/>
-          <a:stretch/>
-        </p:blipFill>
-        <p:spPr>
-          <a:xfrm>
-            <a:off x="5800320" y="1353600"/>
-            <a:ext cx="6094800" cy="3808800"/>
+            <a:ext cx="4923000" cy="3691800"/>
           </a:xfrm>
           <a:prstGeom prst="rect">
             <a:avLst/>
@@ -3901,7 +3847,7 @@
         <p:spPr>
           <a:xfrm>
             <a:off x="685800" y="609480"/>
-            <a:ext cx="10130400" cy="1455120"/>
+            <a:ext cx="10130040" cy="1454760"/>
           </a:xfrm>
           <a:prstGeom prst="rect">
             <a:avLst/>
@@ -3952,7 +3898,7 @@
         <p:spPr>
           <a:xfrm>
             <a:off x="685800" y="2066040"/>
-            <a:ext cx="10130400" cy="4642920"/>
+            <a:ext cx="10130040" cy="4642560"/>
           </a:xfrm>
           <a:prstGeom prst="rect">
             <a:avLst/>
@@ -3973,7 +3919,7 @@
             <a:normAutofit/>
           </a:bodyPr>
           <a:p>
-            <a:pPr marL="285840" indent="-284760">
+            <a:pPr marL="285840" indent="-284400">
               <a:lnSpc>
                 <a:spcPct val="100000"/>
               </a:lnSpc>
@@ -4001,7 +3947,7 @@
             </a:endParaRPr>
           </a:p>
           <a:p>
-            <a:pPr marL="285840" indent="-284760">
+            <a:pPr marL="285840" indent="-284400">
               <a:lnSpc>
                 <a:spcPct val="100000"/>
               </a:lnSpc>
@@ -4029,7 +3975,7 @@
             </a:endParaRPr>
           </a:p>
           <a:p>
-            <a:pPr marL="285840" indent="-284760">
+            <a:pPr marL="285840" indent="-284400">
               <a:lnSpc>
                 <a:spcPct val="100000"/>
               </a:lnSpc>
@@ -4160,7 +4106,7 @@
         <p:spPr>
           <a:xfrm>
             <a:off x="685800" y="654840"/>
-            <a:ext cx="10130400" cy="5831280"/>
+            <a:ext cx="10130040" cy="5830920"/>
           </a:xfrm>
           <a:prstGeom prst="rect">
             <a:avLst/>
@@ -4181,7 +4127,7 @@
             <a:normAutofit/>
           </a:bodyPr>
           <a:p>
-            <a:pPr marL="285840" indent="-284760">
+            <a:pPr marL="285840" indent="-284400">
               <a:lnSpc>
                 <a:spcPct val="100000"/>
               </a:lnSpc>
@@ -4229,7 +4175,7 @@
             </a:endParaRPr>
           </a:p>
           <a:p>
-            <a:pPr lvl="1" marL="743040" indent="-284760">
+            <a:pPr lvl="1" marL="743040" indent="-284400">
               <a:lnSpc>
                 <a:spcPct val="100000"/>
               </a:lnSpc>
@@ -4257,7 +4203,7 @@
             </a:endParaRPr>
           </a:p>
           <a:p>
-            <a:pPr lvl="1" marL="743040" indent="-284760">
+            <a:pPr lvl="1" marL="743040" indent="-284400">
               <a:lnSpc>
                 <a:spcPct val="100000"/>
               </a:lnSpc>
@@ -4285,7 +4231,7 @@
             </a:endParaRPr>
           </a:p>
           <a:p>
-            <a:pPr marL="285840" indent="-284760">
+            <a:pPr marL="285840" indent="-284400">
               <a:lnSpc>
                 <a:spcPct val="100000"/>
               </a:lnSpc>
@@ -4313,7 +4259,7 @@
             </a:endParaRPr>
           </a:p>
           <a:p>
-            <a:pPr lvl="1" marL="743040" indent="-284760">
+            <a:pPr lvl="1" marL="743040" indent="-284400">
               <a:lnSpc>
                 <a:spcPct val="100000"/>
               </a:lnSpc>
@@ -4341,7 +4287,7 @@
             </a:endParaRPr>
           </a:p>
           <a:p>
-            <a:pPr lvl="1" marL="743040" indent="-284760">
+            <a:pPr lvl="1" marL="743040" indent="-284400">
               <a:lnSpc>
                 <a:spcPct val="100000"/>
               </a:lnSpc>
@@ -4369,7 +4315,7 @@
             </a:endParaRPr>
           </a:p>
           <a:p>
-            <a:pPr lvl="1" marL="743040" indent="-284760">
+            <a:pPr lvl="1" marL="743040" indent="-284400">
               <a:lnSpc>
                 <a:spcPct val="100000"/>
               </a:lnSpc>
@@ -4397,7 +4343,7 @@
             </a:endParaRPr>
           </a:p>
           <a:p>
-            <a:pPr marL="285840" indent="-284760">
+            <a:pPr marL="285840" indent="-284400">
               <a:lnSpc>
                 <a:spcPct val="100000"/>
               </a:lnSpc>
@@ -4425,7 +4371,7 @@
             </a:endParaRPr>
           </a:p>
           <a:p>
-            <a:pPr marL="285840" indent="-284760">
+            <a:pPr marL="285840" indent="-284400">
               <a:lnSpc>
                 <a:spcPct val="100000"/>
               </a:lnSpc>
@@ -4493,7 +4439,7 @@
         <p:spPr>
           <a:xfrm>
             <a:off x="685800" y="457200"/>
-            <a:ext cx="10130400" cy="6226560"/>
+            <a:ext cx="10130040" cy="6226200"/>
           </a:xfrm>
           <a:prstGeom prst="rect">
             <a:avLst/>
@@ -4514,7 +4460,7 @@
             <a:noAutofit/>
           </a:bodyPr>
           <a:p>
-            <a:pPr marL="285840" indent="-284760">
+            <a:pPr marL="285840" indent="-284400">
               <a:lnSpc>
                 <a:spcPct val="100000"/>
               </a:lnSpc>
@@ -4562,7 +4508,7 @@
             </a:endParaRPr>
           </a:p>
           <a:p>
-            <a:pPr marL="285840" indent="-284760">
+            <a:pPr marL="285840" indent="-284400">
               <a:lnSpc>
                 <a:spcPct val="100000"/>
               </a:lnSpc>
@@ -4600,7 +4546,7 @@
             </a:endParaRPr>
           </a:p>
           <a:p>
-            <a:pPr marL="285840" indent="-284760">
+            <a:pPr marL="285840" indent="-284400">
               <a:lnSpc>
                 <a:spcPct val="100000"/>
               </a:lnSpc>
@@ -4628,7 +4574,7 @@
             </a:endParaRPr>
           </a:p>
           <a:p>
-            <a:pPr marL="285840" indent="-284760">
+            <a:pPr marL="285840" indent="-284400">
               <a:lnSpc>
                 <a:spcPct val="100000"/>
               </a:lnSpc>
@@ -4676,7 +4622,7 @@
             </a:endParaRPr>
           </a:p>
           <a:p>
-            <a:pPr marL="285840" indent="-284760">
+            <a:pPr marL="285840" indent="-284400">
               <a:lnSpc>
                 <a:spcPct val="100000"/>
               </a:lnSpc>
@@ -4724,7 +4670,7 @@
             </a:endParaRPr>
           </a:p>
           <a:p>
-            <a:pPr marL="285840" indent="-284760">
+            <a:pPr marL="285840" indent="-284400">
               <a:lnSpc>
                 <a:spcPct val="100000"/>
               </a:lnSpc>
@@ -4792,7 +4738,7 @@
         <p:spPr>
           <a:xfrm>
             <a:off x="685800" y="609480"/>
-            <a:ext cx="10130400" cy="1455120"/>
+            <a:ext cx="10130040" cy="1454760"/>
           </a:xfrm>
           <a:prstGeom prst="rect">
             <a:avLst/>
@@ -4843,7 +4789,7 @@
         <p:spPr>
           <a:xfrm>
             <a:off x="685800" y="2142000"/>
-            <a:ext cx="10130400" cy="4529520"/>
+            <a:ext cx="10130040" cy="4529160"/>
           </a:xfrm>
           <a:prstGeom prst="rect">
             <a:avLst/>
@@ -4864,7 +4810,7 @@
             <a:noAutofit/>
           </a:bodyPr>
           <a:p>
-            <a:pPr marL="285840" indent="-284760">
+            <a:pPr marL="285840" indent="-284400">
               <a:lnSpc>
                 <a:spcPct val="100000"/>
               </a:lnSpc>
@@ -4892,7 +4838,7 @@
             </a:endParaRPr>
           </a:p>
           <a:p>
-            <a:pPr marL="285840" indent="-284760">
+            <a:pPr marL="285840" indent="-284400">
               <a:lnSpc>
                 <a:spcPct val="100000"/>
               </a:lnSpc>
@@ -4920,7 +4866,7 @@
             </a:endParaRPr>
           </a:p>
           <a:p>
-            <a:pPr lvl="1" marL="743040" indent="-284760">
+            <a:pPr lvl="1" marL="743040" indent="-284400">
               <a:lnSpc>
                 <a:spcPct val="100000"/>
               </a:lnSpc>
@@ -4948,7 +4894,7 @@
             </a:endParaRPr>
           </a:p>
           <a:p>
-            <a:pPr lvl="1" marL="743040" indent="-284760">
+            <a:pPr lvl="1" marL="743040" indent="-284400">
               <a:lnSpc>
                 <a:spcPct val="100000"/>
               </a:lnSpc>
@@ -5029,7 +4975,7 @@
         <p:spPr>
           <a:xfrm>
             <a:off x="685800" y="609480"/>
-            <a:ext cx="10130400" cy="1455120"/>
+            <a:ext cx="10130040" cy="1454760"/>
           </a:xfrm>
           <a:prstGeom prst="rect">
             <a:avLst/>
@@ -5080,7 +5026,7 @@
         <p:spPr>
           <a:xfrm>
             <a:off x="685800" y="2142000"/>
-            <a:ext cx="10130400" cy="3647880"/>
+            <a:ext cx="10130040" cy="3647520"/>
           </a:xfrm>
           <a:prstGeom prst="rect">
             <a:avLst/>
@@ -5101,7 +5047,7 @@
             <a:noAutofit/>
           </a:bodyPr>
           <a:p>
-            <a:pPr marL="285840" indent="-284760">
+            <a:pPr marL="285840" indent="-284400">
               <a:lnSpc>
                 <a:spcPct val="100000"/>
               </a:lnSpc>
@@ -5129,7 +5075,7 @@
             </a:endParaRPr>
           </a:p>
           <a:p>
-            <a:pPr marL="285840" indent="-284760">
+            <a:pPr marL="285840" indent="-284400">
               <a:lnSpc>
                 <a:spcPct val="100000"/>
               </a:lnSpc>
@@ -5157,7 +5103,7 @@
             </a:endParaRPr>
           </a:p>
           <a:p>
-            <a:pPr marL="285840" indent="-284760">
+            <a:pPr marL="285840" indent="-284400">
               <a:lnSpc>
                 <a:spcPct val="100000"/>
               </a:lnSpc>
@@ -5225,7 +5171,7 @@
         <p:spPr>
           <a:xfrm>
             <a:off x="685800" y="609480"/>
-            <a:ext cx="10130400" cy="1455120"/>
+            <a:ext cx="10130040" cy="1454760"/>
           </a:xfrm>
           <a:prstGeom prst="rect">
             <a:avLst/>
@@ -5276,7 +5222,7 @@
         <p:spPr>
           <a:xfrm>
             <a:off x="685800" y="1598400"/>
-            <a:ext cx="10569960" cy="3647880"/>
+            <a:ext cx="10569600" cy="3647520"/>
           </a:xfrm>
           <a:prstGeom prst="rect">
             <a:avLst/>
@@ -5297,7 +5243,7 @@
             <a:noAutofit/>
           </a:bodyPr>
           <a:p>
-            <a:pPr marL="285840" indent="-284760">
+            <a:pPr marL="285840" indent="-284400">
               <a:lnSpc>
                 <a:spcPct val="100000"/>
               </a:lnSpc>
@@ -5325,7 +5271,7 @@
             </a:endParaRPr>
           </a:p>
           <a:p>
-            <a:pPr marL="285840" indent="-284760">
+            <a:pPr marL="285840" indent="-284400">
               <a:lnSpc>
                 <a:spcPct val="100000"/>
               </a:lnSpc>
@@ -5353,7 +5299,7 @@
             </a:endParaRPr>
           </a:p>
           <a:p>
-            <a:pPr marL="285840" indent="-284760">
+            <a:pPr marL="285840" indent="-284400">
               <a:lnSpc>
                 <a:spcPct val="100000"/>
               </a:lnSpc>
@@ -5381,7 +5327,7 @@
             </a:endParaRPr>
           </a:p>
           <a:p>
-            <a:pPr marL="285840" indent="-284760">
+            <a:pPr marL="285840" indent="-284400">
               <a:lnSpc>
                 <a:spcPct val="100000"/>
               </a:lnSpc>
@@ -5436,7 +5382,7 @@
         <p:spPr>
           <a:xfrm>
             <a:off x="2329200" y="4388040"/>
-            <a:ext cx="6247440" cy="2183400"/>
+            <a:ext cx="6247080" cy="2183040"/>
           </a:xfrm>
           <a:prstGeom prst="rect">
             <a:avLst/>
@@ -5488,7 +5434,7 @@
         <p:spPr>
           <a:xfrm>
             <a:off x="685800" y="469440"/>
-            <a:ext cx="10130400" cy="5320440"/>
+            <a:ext cx="10130040" cy="5320080"/>
           </a:xfrm>
           <a:prstGeom prst="rect">
             <a:avLst/>
@@ -5509,7 +5455,7 @@
             <a:noAutofit/>
           </a:bodyPr>
           <a:p>
-            <a:pPr marL="285840" indent="-284760">
+            <a:pPr marL="285840" indent="-284400">
               <a:lnSpc>
                 <a:spcPct val="100000"/>
               </a:lnSpc>
@@ -5563,8 +5509,8 @@
         </p:blipFill>
         <p:spPr>
           <a:xfrm>
-            <a:off x="1017720" y="3454560"/>
-            <a:ext cx="2716560" cy="849960"/>
+            <a:off x="4411800" y="3456000"/>
+            <a:ext cx="2716200" cy="849600"/>
           </a:xfrm>
           <a:prstGeom prst="rect">
             <a:avLst/>
@@ -5616,7 +5562,7 @@
         <p:spPr>
           <a:xfrm>
             <a:off x="685800" y="444960"/>
-            <a:ext cx="4379400" cy="6066000"/>
+            <a:ext cx="4379040" cy="6065640"/>
           </a:xfrm>
           <a:prstGeom prst="rect">
             <a:avLst/>
@@ -5650,7 +5596,7 @@
             </a:endParaRPr>
           </a:p>
           <a:p>
-            <a:pPr marL="285840" indent="-284760">
+            <a:pPr marL="285840" indent="-284400">
               <a:lnSpc>
                 <a:spcPct val="100000"/>
               </a:lnSpc>
@@ -5705,7 +5651,7 @@
         <p:spPr>
           <a:xfrm>
             <a:off x="5383440" y="1408320"/>
-            <a:ext cx="6094800" cy="4139280"/>
+            <a:ext cx="6094440" cy="4138920"/>
           </a:xfrm>
           <a:prstGeom prst="rect">
             <a:avLst/>

</xml_diff>

<commit_message>
Small changes in script and report
</commit_message>
<xml_diff>
--- a/Report/presentazione.pptx
+++ b/Report/presentazione.pptx
@@ -2776,7 +2776,7 @@
         <p:spPr>
           <a:xfrm>
             <a:off x="0" y="0"/>
-            <a:ext cx="12187440" cy="6854760"/>
+            <a:ext cx="12186360" cy="6853680"/>
           </a:xfrm>
           <a:prstGeom prst="rect">
             <a:avLst/>
@@ -3062,7 +3062,7 @@
         <p:spPr>
           <a:xfrm>
             <a:off x="0" y="0"/>
-            <a:ext cx="12187440" cy="6854760"/>
+            <a:ext cx="12186360" cy="6853680"/>
           </a:xfrm>
           <a:prstGeom prst="rect">
             <a:avLst/>
@@ -3334,7 +3334,7 @@
         <p:spPr>
           <a:xfrm>
             <a:off x="3962520" y="1964160"/>
-            <a:ext cx="7196400" cy="2419920"/>
+            <a:ext cx="7195320" cy="2418840"/>
           </a:xfrm>
           <a:prstGeom prst="rect">
             <a:avLst/>
@@ -3352,7 +3352,7 @@
         </p:style>
         <p:txBody>
           <a:bodyPr lIns="90000" rIns="90000" tIns="45000" bIns="45000" anchor="b">
-            <a:normAutofit fontScale="91000"/>
+            <a:normAutofit/>
           </a:bodyPr>
           <a:p>
             <a:pPr algn="r">
@@ -3379,9 +3379,18 @@
                 <a:latin typeface="Calibri Light"/>
                 <a:ea typeface="DejaVu Sans"/>
               </a:rPr>
-              <a:t>Efficient </a:t>
-            </a:r>
-            <a:br/>
+              <a:t>Efficient full domain </a:t>
+            </a:r>
+            <a:endParaRPr b="0" lang="it-IT" sz="4800" spc="-1" strike="noStrike">
+              <a:latin typeface="Arial"/>
+            </a:endParaRPr>
+          </a:p>
+          <a:p>
+            <a:pPr algn="r">
+              <a:lnSpc>
+                <a:spcPct val="100000"/>
+              </a:lnSpc>
+            </a:pPr>
             <a:r>
               <a:rPr b="0" lang="it-IT" sz="4800" spc="-1" strike="noStrike" cap="all">
                 <a:solidFill>
@@ -3390,7 +3399,7 @@
                 <a:latin typeface="Calibri Light"/>
                 <a:ea typeface="DejaVu Sans"/>
               </a:rPr>
-              <a:t>full domain k-anonymity</a:t>
+              <a:t>k-anonymity</a:t>
             </a:r>
             <a:endParaRPr b="0" lang="it-IT" sz="4800" spc="-1" strike="noStrike">
               <a:latin typeface="Arial"/>
@@ -3407,7 +3416,7 @@
         <p:spPr>
           <a:xfrm>
             <a:off x="3962520" y="4385880"/>
-            <a:ext cx="7196400" cy="1404000"/>
+            <a:ext cx="7195320" cy="1402920"/>
           </a:xfrm>
           <a:prstGeom prst="rect">
             <a:avLst/>
@@ -3541,7 +3550,7 @@
         <p:spPr>
           <a:xfrm>
             <a:off x="914400" y="177120"/>
-            <a:ext cx="10402920" cy="6517440"/>
+            <a:ext cx="10401840" cy="6516360"/>
           </a:xfrm>
           <a:prstGeom prst="rect">
             <a:avLst/>
@@ -3593,7 +3602,7 @@
         <p:spPr>
           <a:xfrm>
             <a:off x="685800" y="0"/>
-            <a:ext cx="10130040" cy="1315800"/>
+            <a:ext cx="10128960" cy="1314720"/>
           </a:xfrm>
           <a:prstGeom prst="rect">
             <a:avLst/>
@@ -3648,7 +3657,7 @@
         <p:spPr>
           <a:xfrm>
             <a:off x="685800" y="1829520"/>
-            <a:ext cx="10666440" cy="3695400"/>
+            <a:ext cx="10665360" cy="3694320"/>
           </a:xfrm>
           <a:prstGeom prst="rect">
             <a:avLst/>
@@ -3671,7 +3680,7 @@
         <p:spPr>
           <a:xfrm>
             <a:off x="685800" y="1829520"/>
-            <a:ext cx="4927680" cy="3695400"/>
+            <a:ext cx="4926600" cy="3694320"/>
           </a:xfrm>
           <a:prstGeom prst="rect">
             <a:avLst/>
@@ -3720,7 +3729,7 @@
         <p:spPr>
           <a:xfrm>
             <a:off x="685800" y="0"/>
-            <a:ext cx="10130040" cy="1315800"/>
+            <a:ext cx="10128960" cy="1314720"/>
           </a:xfrm>
           <a:prstGeom prst="rect">
             <a:avLst/>
@@ -3775,7 +3784,7 @@
         <p:spPr>
           <a:xfrm>
             <a:off x="685800" y="1829520"/>
-            <a:ext cx="10666440" cy="3695400"/>
+            <a:ext cx="10665360" cy="3694320"/>
           </a:xfrm>
           <a:prstGeom prst="rect">
             <a:avLst/>
@@ -3798,7 +3807,7 @@
         <p:spPr>
           <a:xfrm>
             <a:off x="5751360" y="1833120"/>
-            <a:ext cx="4923000" cy="3691800"/>
+            <a:ext cx="4921920" cy="3690720"/>
           </a:xfrm>
           <a:prstGeom prst="rect">
             <a:avLst/>
@@ -3847,7 +3856,7 @@
         <p:spPr>
           <a:xfrm>
             <a:off x="685800" y="609480"/>
-            <a:ext cx="10130040" cy="1454760"/>
+            <a:ext cx="10128960" cy="1453680"/>
           </a:xfrm>
           <a:prstGeom prst="rect">
             <a:avLst/>
@@ -3898,7 +3907,7 @@
         <p:spPr>
           <a:xfrm>
             <a:off x="685800" y="2066040"/>
-            <a:ext cx="10130040" cy="4642560"/>
+            <a:ext cx="10128960" cy="4641480"/>
           </a:xfrm>
           <a:prstGeom prst="rect">
             <a:avLst/>
@@ -3919,7 +3928,7 @@
             <a:normAutofit/>
           </a:bodyPr>
           <a:p>
-            <a:pPr marL="285840" indent="-284400">
+            <a:pPr marL="285840" indent="-283320">
               <a:lnSpc>
                 <a:spcPct val="100000"/>
               </a:lnSpc>
@@ -3947,7 +3956,7 @@
             </a:endParaRPr>
           </a:p>
           <a:p>
-            <a:pPr marL="285840" indent="-284400">
+            <a:pPr marL="285840" indent="-283320">
               <a:lnSpc>
                 <a:spcPct val="100000"/>
               </a:lnSpc>
@@ -3975,7 +3984,7 @@
             </a:endParaRPr>
           </a:p>
           <a:p>
-            <a:pPr marL="285840" indent="-284400">
+            <a:pPr marL="285840" indent="-283320">
               <a:lnSpc>
                 <a:spcPct val="100000"/>
               </a:lnSpc>
@@ -4003,13 +4012,18 @@
             </a:endParaRPr>
           </a:p>
           <a:p>
-            <a:pPr>
+            <a:pPr marL="285840" indent="-283320">
               <a:lnSpc>
                 <a:spcPct val="100000"/>
               </a:lnSpc>
               <a:spcAft>
                 <a:spcPts val="1001"/>
               </a:spcAft>
+              <a:buClr>
+                <a:srgbClr val="ffffff"/>
+              </a:buClr>
+              <a:buFont typeface="Arial"/>
+              <a:buChar char="•"/>
             </a:pPr>
             <a:r>
               <a:rPr b="0" lang="it-IT" sz="1800" spc="-1" strike="noStrike">
@@ -4106,7 +4120,7 @@
         <p:spPr>
           <a:xfrm>
             <a:off x="685800" y="654840"/>
-            <a:ext cx="10130040" cy="5830920"/>
+            <a:ext cx="10128960" cy="5829840"/>
           </a:xfrm>
           <a:prstGeom prst="rect">
             <a:avLst/>
@@ -4127,7 +4141,7 @@
             <a:normAutofit/>
           </a:bodyPr>
           <a:p>
-            <a:pPr marL="285840" indent="-284400">
+            <a:pPr marL="285840" indent="-283320">
               <a:lnSpc>
                 <a:spcPct val="100000"/>
               </a:lnSpc>
@@ -4148,7 +4162,7 @@
                 <a:latin typeface="Calibri"/>
                 <a:ea typeface="DejaVu Sans"/>
               </a:rPr>
-              <a:t>Consider a vector of n domains with correspond- ing domain hierarchies H1 . . . Hn . A vector of n domains ⟨DA1 , ..., DAn ⟩ is said to be a direct multi-attribute domain generalization (also denoted &lt;</a:t>
+              <a:t>Consider a vector of n domains with corresponding domain hierarchies H1 . . . Hn . A vector of n domains ⟨DA1 , ..., DAn ⟩ is said to be a direct multi-attribute domain generalization (also denoted &lt;</a:t>
             </a:r>
             <a:r>
               <a:rPr b="0" lang="it-IT" sz="1800" spc="-1" strike="noStrike" baseline="-14000000">
@@ -4175,7 +4189,7 @@
             </a:endParaRPr>
           </a:p>
           <a:p>
-            <a:pPr lvl="1" marL="743040" indent="-284400">
+            <a:pPr lvl="1" marL="743040" indent="-283320">
               <a:lnSpc>
                 <a:spcPct val="100000"/>
               </a:lnSpc>
@@ -4203,7 +4217,7 @@
             </a:endParaRPr>
           </a:p>
           <a:p>
-            <a:pPr lvl="1" marL="743040" indent="-284400">
+            <a:pPr lvl="1" marL="743040" indent="-283320">
               <a:lnSpc>
                 <a:spcPct val="100000"/>
               </a:lnSpc>
@@ -4231,7 +4245,7 @@
             </a:endParaRPr>
           </a:p>
           <a:p>
-            <a:pPr marL="285840" indent="-284400">
+            <a:pPr marL="285840" indent="-283320">
               <a:lnSpc>
                 <a:spcPct val="100000"/>
               </a:lnSpc>
@@ -4259,7 +4273,7 @@
             </a:endParaRPr>
           </a:p>
           <a:p>
-            <a:pPr lvl="1" marL="743040" indent="-284400">
+            <a:pPr lvl="1" marL="743040" indent="-283320">
               <a:lnSpc>
                 <a:spcPct val="100000"/>
               </a:lnSpc>
@@ -4287,7 +4301,7 @@
             </a:endParaRPr>
           </a:p>
           <a:p>
-            <a:pPr lvl="1" marL="743040" indent="-284400">
+            <a:pPr lvl="1" marL="743040" indent="-283320">
               <a:lnSpc>
                 <a:spcPct val="100000"/>
               </a:lnSpc>
@@ -4315,7 +4329,7 @@
             </a:endParaRPr>
           </a:p>
           <a:p>
-            <a:pPr lvl="1" marL="743040" indent="-284400">
+            <a:pPr lvl="1" marL="743040" indent="-283320">
               <a:lnSpc>
                 <a:spcPct val="100000"/>
               </a:lnSpc>
@@ -4343,7 +4357,7 @@
             </a:endParaRPr>
           </a:p>
           <a:p>
-            <a:pPr marL="285840" indent="-284400">
+            <a:pPr marL="285840" indent="-283320">
               <a:lnSpc>
                 <a:spcPct val="100000"/>
               </a:lnSpc>
@@ -4371,7 +4385,7 @@
             </a:endParaRPr>
           </a:p>
           <a:p>
-            <a:pPr marL="285840" indent="-284400">
+            <a:pPr marL="285840" indent="-283320">
               <a:lnSpc>
                 <a:spcPct val="100000"/>
               </a:lnSpc>
@@ -4439,7 +4453,7 @@
         <p:spPr>
           <a:xfrm>
             <a:off x="685800" y="457200"/>
-            <a:ext cx="10130040" cy="6226200"/>
+            <a:ext cx="10128960" cy="6225120"/>
           </a:xfrm>
           <a:prstGeom prst="rect">
             <a:avLst/>
@@ -4460,7 +4474,7 @@
             <a:noAutofit/>
           </a:bodyPr>
           <a:p>
-            <a:pPr marL="285840" indent="-284400">
+            <a:pPr marL="285840" indent="-283320">
               <a:lnSpc>
                 <a:spcPct val="100000"/>
               </a:lnSpc>
@@ -4508,7 +4522,7 @@
             </a:endParaRPr>
           </a:p>
           <a:p>
-            <a:pPr marL="285840" indent="-284400">
+            <a:pPr marL="285840" indent="-283320">
               <a:lnSpc>
                 <a:spcPct val="100000"/>
               </a:lnSpc>
@@ -4546,7 +4560,7 @@
             </a:endParaRPr>
           </a:p>
           <a:p>
-            <a:pPr marL="285840" indent="-284400">
+            <a:pPr marL="285840" indent="-283320">
               <a:lnSpc>
                 <a:spcPct val="100000"/>
               </a:lnSpc>
@@ -4574,7 +4588,7 @@
             </a:endParaRPr>
           </a:p>
           <a:p>
-            <a:pPr marL="285840" indent="-284400">
+            <a:pPr marL="285840" indent="-283320">
               <a:lnSpc>
                 <a:spcPct val="100000"/>
               </a:lnSpc>
@@ -4622,7 +4636,7 @@
             </a:endParaRPr>
           </a:p>
           <a:p>
-            <a:pPr marL="285840" indent="-284400">
+            <a:pPr marL="285840" indent="-283320">
               <a:lnSpc>
                 <a:spcPct val="100000"/>
               </a:lnSpc>
@@ -4643,7 +4657,7 @@
                 <a:latin typeface="Calibri"/>
                 <a:ea typeface="DejaVu Sans"/>
               </a:rPr>
-              <a:t>Rollup Property Let T be a relation, and let P and Q be sets of attributes such that DP ≤</a:t>
+              <a:t>Rollup Property: Let T be a relation, and let P and Q be sets of attributes such that DP ≤</a:t>
             </a:r>
             <a:r>
               <a:rPr b="0" lang="it-IT" sz="1800" spc="-1" strike="noStrike" baseline="-14000000">
@@ -4670,7 +4684,7 @@
             </a:endParaRPr>
           </a:p>
           <a:p>
-            <a:pPr marL="285840" indent="-284400">
+            <a:pPr marL="285840" indent="-283320">
               <a:lnSpc>
                 <a:spcPct val="100000"/>
               </a:lnSpc>
@@ -4738,7 +4752,7 @@
         <p:spPr>
           <a:xfrm>
             <a:off x="685800" y="609480"/>
-            <a:ext cx="10130040" cy="1454760"/>
+            <a:ext cx="10128960" cy="1453680"/>
           </a:xfrm>
           <a:prstGeom prst="rect">
             <a:avLst/>
@@ -4789,7 +4803,7 @@
         <p:spPr>
           <a:xfrm>
             <a:off x="685800" y="2142000"/>
-            <a:ext cx="10130040" cy="4529160"/>
+            <a:ext cx="10128960" cy="4528080"/>
           </a:xfrm>
           <a:prstGeom prst="rect">
             <a:avLst/>
@@ -4810,7 +4824,7 @@
             <a:noAutofit/>
           </a:bodyPr>
           <a:p>
-            <a:pPr marL="285840" indent="-284400">
+            <a:pPr marL="285840" indent="-283320">
               <a:lnSpc>
                 <a:spcPct val="100000"/>
               </a:lnSpc>
@@ -4838,7 +4852,7 @@
             </a:endParaRPr>
           </a:p>
           <a:p>
-            <a:pPr marL="285840" indent="-284400">
+            <a:pPr marL="285840" indent="-283320">
               <a:lnSpc>
                 <a:spcPct val="100000"/>
               </a:lnSpc>
@@ -4866,7 +4880,7 @@
             </a:endParaRPr>
           </a:p>
           <a:p>
-            <a:pPr lvl="1" marL="743040" indent="-284400">
+            <a:pPr lvl="1" marL="743040" indent="-283320">
               <a:lnSpc>
                 <a:spcPct val="100000"/>
               </a:lnSpc>
@@ -4887,14 +4901,14 @@
                 <a:latin typeface="Calibri"/>
                 <a:ea typeface="DejaVu Sans"/>
               </a:rPr>
-              <a:t>1. Each iteration considers a graph of candidate multi-attribute generalizations (nodes) constructed from a subset of the quasi-identifier of size i. We denote the set of candidate nodes Ci. The set of direct multi-attribute generalization relationships (edges) connect-ing these nodes is denoted Ei. A modified breadth-first search over the graph yields the set of multi-attribute generalizations of size i with respect to which T is k-anonymous (denoted Si). </a:t>
+              <a:t>1. Each iteration considers a graph of candidate multi-attribute generalizations (nodes) constructed from a subset of the quasi-identifier of size i. We denote the set of candidate nodes Ci. The set of direct multi-attribute generalization relationships (edges) connecting these nodes is denoted Ei. A modified breadth-first search over the graph yields the set of multi-attribute generalizations of size i with respect to which T is k-anonymous (denoted Si). </a:t>
             </a:r>
             <a:endParaRPr b="0" lang="it-IT" sz="1600" spc="-1" strike="noStrike">
               <a:latin typeface="Arial"/>
             </a:endParaRPr>
           </a:p>
           <a:p>
-            <a:pPr lvl="1" marL="743040" indent="-284400">
+            <a:pPr lvl="1" marL="743040" indent="-283320">
               <a:lnSpc>
                 <a:spcPct val="100000"/>
               </a:lnSpc>
@@ -4975,7 +4989,7 @@
         <p:spPr>
           <a:xfrm>
             <a:off x="685800" y="609480"/>
-            <a:ext cx="10130040" cy="1454760"/>
+            <a:ext cx="10128960" cy="1453680"/>
           </a:xfrm>
           <a:prstGeom prst="rect">
             <a:avLst/>
@@ -5026,7 +5040,7 @@
         <p:spPr>
           <a:xfrm>
             <a:off x="685800" y="2142000"/>
-            <a:ext cx="10130040" cy="3647520"/>
+            <a:ext cx="10128960" cy="3646440"/>
           </a:xfrm>
           <a:prstGeom prst="rect">
             <a:avLst/>
@@ -5047,7 +5061,7 @@
             <a:noAutofit/>
           </a:bodyPr>
           <a:p>
-            <a:pPr marL="285840" indent="-284400">
+            <a:pPr marL="285840" indent="-283320">
               <a:lnSpc>
                 <a:spcPct val="100000"/>
               </a:lnSpc>
@@ -5075,7 +5089,7 @@
             </a:endParaRPr>
           </a:p>
           <a:p>
-            <a:pPr marL="285840" indent="-284400">
+            <a:pPr marL="285840" indent="-283320">
               <a:lnSpc>
                 <a:spcPct val="100000"/>
               </a:lnSpc>
@@ -5103,7 +5117,7 @@
             </a:endParaRPr>
           </a:p>
           <a:p>
-            <a:pPr marL="285840" indent="-284400">
+            <a:pPr marL="285840" indent="-283320">
               <a:lnSpc>
                 <a:spcPct val="100000"/>
               </a:lnSpc>
@@ -5171,7 +5185,7 @@
         <p:spPr>
           <a:xfrm>
             <a:off x="685800" y="609480"/>
-            <a:ext cx="10130040" cy="1454760"/>
+            <a:ext cx="10128960" cy="1453680"/>
           </a:xfrm>
           <a:prstGeom prst="rect">
             <a:avLst/>
@@ -5222,7 +5236,7 @@
         <p:spPr>
           <a:xfrm>
             <a:off x="685800" y="1598400"/>
-            <a:ext cx="10569600" cy="3647520"/>
+            <a:ext cx="10568520" cy="3646440"/>
           </a:xfrm>
           <a:prstGeom prst="rect">
             <a:avLst/>
@@ -5243,7 +5257,7 @@
             <a:noAutofit/>
           </a:bodyPr>
           <a:p>
-            <a:pPr marL="285840" indent="-284400">
+            <a:pPr marL="285840" indent="-283320">
               <a:lnSpc>
                 <a:spcPct val="100000"/>
               </a:lnSpc>
@@ -5271,7 +5285,7 @@
             </a:endParaRPr>
           </a:p>
           <a:p>
-            <a:pPr marL="285840" indent="-284400">
+            <a:pPr marL="285840" indent="-283320">
               <a:lnSpc>
                 <a:spcPct val="100000"/>
               </a:lnSpc>
@@ -5299,7 +5313,7 @@
             </a:endParaRPr>
           </a:p>
           <a:p>
-            <a:pPr marL="285840" indent="-284400">
+            <a:pPr marL="285840" indent="-283320">
               <a:lnSpc>
                 <a:spcPct val="100000"/>
               </a:lnSpc>
@@ -5320,14 +5334,14 @@
                 <a:latin typeface="Calibri"/>
                 <a:ea typeface="DejaVu Sans"/>
               </a:rPr>
-              <a:t>The final phase is edge generation, through which the direct multi-attribute generalization relationships among can- didate nodes are constructed. </a:t>
+              <a:t>The final phase is edge generation, through which the direct multi-attribute generalization relationships among candidate nodes are constructed. </a:t>
             </a:r>
             <a:endParaRPr b="0" lang="it-IT" sz="1800" spc="-1" strike="noStrike">
               <a:latin typeface="Arial"/>
             </a:endParaRPr>
           </a:p>
           <a:p>
-            <a:pPr marL="285840" indent="-284400">
+            <a:pPr marL="285840" indent="-283320">
               <a:lnSpc>
                 <a:spcPct val="100000"/>
               </a:lnSpc>
@@ -5382,7 +5396,7 @@
         <p:spPr>
           <a:xfrm>
             <a:off x="2329200" y="4388040"/>
-            <a:ext cx="6247080" cy="2183040"/>
+            <a:ext cx="6246000" cy="2181960"/>
           </a:xfrm>
           <a:prstGeom prst="rect">
             <a:avLst/>
@@ -5434,7 +5448,7 @@
         <p:spPr>
           <a:xfrm>
             <a:off x="685800" y="469440"/>
-            <a:ext cx="10130040" cy="5320080"/>
+            <a:ext cx="10128960" cy="5319000"/>
           </a:xfrm>
           <a:prstGeom prst="rect">
             <a:avLst/>
@@ -5455,7 +5469,7 @@
             <a:noAutofit/>
           </a:bodyPr>
           <a:p>
-            <a:pPr marL="285840" indent="-284400">
+            <a:pPr marL="285840" indent="-283320">
               <a:lnSpc>
                 <a:spcPct val="100000"/>
               </a:lnSpc>
@@ -5510,7 +5524,7 @@
         <p:spPr>
           <a:xfrm>
             <a:off x="4411800" y="3456000"/>
-            <a:ext cx="2716200" cy="849600"/>
+            <a:ext cx="2715120" cy="848520"/>
           </a:xfrm>
           <a:prstGeom prst="rect">
             <a:avLst/>
@@ -5562,7 +5576,7 @@
         <p:spPr>
           <a:xfrm>
             <a:off x="685800" y="444960"/>
-            <a:ext cx="4379040" cy="6065640"/>
+            <a:ext cx="4377960" cy="6064560"/>
           </a:xfrm>
           <a:prstGeom prst="rect">
             <a:avLst/>
@@ -5596,7 +5610,7 @@
             </a:endParaRPr>
           </a:p>
           <a:p>
-            <a:pPr marL="285840" indent="-284400">
+            <a:pPr marL="285840" indent="-283320">
               <a:lnSpc>
                 <a:spcPct val="100000"/>
               </a:lnSpc>
@@ -5651,7 +5665,7 @@
         <p:spPr>
           <a:xfrm>
             <a:off x="5383440" y="1408320"/>
-            <a:ext cx="6094440" cy="4138920"/>
+            <a:ext cx="6093360" cy="4137840"/>
           </a:xfrm>
           <a:prstGeom prst="rect">
             <a:avLst/>

</xml_diff>